<commit_message>
feat(tpv): :sparkles: add essay
</commit_message>
<xml_diff>
--- a/4 тпв/Выступление.pptx
+++ b/4 тпв/Выступление.pptx
@@ -296,7 +296,7 @@
           <a:p>
             <a:fld id="{6AD6EE87-EBD5-4F12-A48A-63ACA297AC8F}" type="datetimeFigureOut">
               <a:rPr lang="en-US" dirty="0"/>
-              <a:t>4/9/2024</a:t>
+              <a:t>6/1/2024</a:t>
             </a:fld>
             <a:endParaRPr lang="en-US" dirty="0"/>
           </a:p>
@@ -534,7 +534,7 @@
           <a:p>
             <a:fld id="{4CD73815-2707-4475-8F1A-B873CB631BB4}" type="datetimeFigureOut">
               <a:rPr lang="en-US" dirty="0"/>
-              <a:t>4/9/2024</a:t>
+              <a:t>6/1/2024</a:t>
             </a:fld>
             <a:endParaRPr lang="en-US" dirty="0"/>
           </a:p>
@@ -709,7 +709,7 @@
           <a:p>
             <a:fld id="{2A4AFB99-0EAB-4182-AFF8-E214C82A68F6}" type="datetimeFigureOut">
               <a:rPr lang="en-US" dirty="0"/>
-              <a:t>4/9/2024</a:t>
+              <a:t>6/1/2024</a:t>
             </a:fld>
             <a:endParaRPr lang="en-US" dirty="0"/>
           </a:p>
@@ -909,7 +909,7 @@
           <a:p>
             <a:fld id="{A5D3794B-289A-4A80-97D7-111025398D45}" type="datetimeFigureOut">
               <a:rPr lang="en-US" dirty="0"/>
-              <a:t>4/9/2024</a:t>
+              <a:t>6/1/2024</a:t>
             </a:fld>
             <a:endParaRPr lang="en-US" dirty="0"/>
           </a:p>
@@ -1161,7 +1161,7 @@
           <a:p>
             <a:fld id="{5A61015F-7CC6-4D0A-9D87-873EA4C304CC}" type="datetimeFigureOut">
               <a:rPr lang="en-US" dirty="0"/>
-              <a:t>4/9/2024</a:t>
+              <a:t>6/1/2024</a:t>
             </a:fld>
             <a:endParaRPr lang="en-US" dirty="0"/>
           </a:p>
@@ -1503,7 +1503,7 @@
           <a:p>
             <a:fld id="{93C6A301-0538-44EC-B09D-202E1042A48B}" type="datetimeFigureOut">
               <a:rPr lang="en-US" dirty="0"/>
-              <a:t>4/9/2024</a:t>
+              <a:t>6/1/2024</a:t>
             </a:fld>
             <a:endParaRPr lang="en-US" dirty="0"/>
           </a:p>
@@ -1900,7 +1900,7 @@
           <a:p>
             <a:fld id="{D789574A-8875-45EF-8EA2-3CAA0F7ABC4C}" type="datetimeFigureOut">
               <a:rPr lang="en-US" dirty="0"/>
-              <a:t>4/9/2024</a:t>
+              <a:t>6/1/2024</a:t>
             </a:fld>
             <a:endParaRPr lang="en-US" dirty="0"/>
           </a:p>
@@ -2013,7 +2013,7 @@
           <a:p>
             <a:fld id="{67EF4D4C-5367-4C26-9E2B-D8088D7FCA81}" type="datetimeFigureOut">
               <a:rPr lang="en-US" dirty="0"/>
-              <a:t>4/9/2024</a:t>
+              <a:t>6/1/2024</a:t>
             </a:fld>
             <a:endParaRPr lang="en-US" dirty="0"/>
           </a:p>
@@ -2103,7 +2103,7 @@
           <a:p>
             <a:fld id="{56E91E96-98B0-4413-9547-46F3504108EF}" type="datetimeFigureOut">
               <a:rPr lang="en-US" dirty="0"/>
-              <a:t>4/9/2024</a:t>
+              <a:t>6/1/2024</a:t>
             </a:fld>
             <a:endParaRPr lang="en-US" dirty="0"/>
           </a:p>
@@ -2388,7 +2388,7 @@
           <a:p>
             <a:fld id="{05C68B11-C5A8-448C-8CE9-B1A273C79CFC}" type="datetimeFigureOut">
               <a:rPr lang="en-US" dirty="0"/>
-              <a:t>4/9/2024</a:t>
+              <a:t>6/1/2024</a:t>
             </a:fld>
             <a:endParaRPr lang="en-US" dirty="0"/>
           </a:p>
@@ -2663,7 +2663,7 @@
           <a:p>
             <a:fld id="{C7616CA0-919D-4A49-9C8A-62FDFB3A5183}" type="datetimeFigureOut">
               <a:rPr lang="en-US" dirty="0"/>
-              <a:t>4/9/2024</a:t>
+              <a:t>6/1/2024</a:t>
             </a:fld>
             <a:endParaRPr lang="en-US" dirty="0"/>
           </a:p>
@@ -2909,7 +2909,7 @@
             <a:fld id="{90298CD5-6C1E-4009-B41F-6DF62E31D3BE}" type="datetimeFigureOut">
               <a:rPr lang="en-US" dirty="0"/>
               <a:pPr/>
-              <a:t>4/9/2024</a:t>
+              <a:t>6/1/2024</a:t>
             </a:fld>
             <a:endParaRPr lang="en-US" dirty="0"/>
           </a:p>
@@ -3432,7 +3432,6 @@
               <a:rPr lang="ru-RU" b="1" dirty="0"/>
               <a:t>функционального программирования</a:t>
             </a:r>
-            <a:endParaRPr lang="ru-RU" b="1" dirty="0"/>
           </a:p>
         </p:txBody>
       </p:sp>
@@ -3458,15 +3457,7 @@
           <a:p>
             <a:r>
               <a:rPr lang="ru-RU" sz="2400" b="1" dirty="0" smtClean="0"/>
-              <a:t>Барсуков </a:t>
-            </a:r>
-            <a:r>
-              <a:rPr lang="ru-RU" sz="2400" b="1" dirty="0" smtClean="0"/>
-              <a:t>М</a:t>
-            </a:r>
-            <a:r>
-              <a:rPr lang="ru-RU" sz="2400" b="1" dirty="0" smtClean="0"/>
-              <a:t>аксим</a:t>
+              <a:t>Барсуков Максим</a:t>
             </a:r>
           </a:p>
           <a:p>
@@ -4139,6 +4130,13 @@
   <p:clrMapOvr>
     <a:masterClrMapping/>
   </p:clrMapOvr>
+  <p:timing>
+    <p:tnLst>
+      <p:par>
+        <p:cTn id="1" dur="indefinite" restart="never" nodeType="tmRoot"/>
+      </p:par>
+    </p:tnLst>
+  </p:timing>
 </p:sld>
 </file>
 
@@ -6534,20 +6532,12 @@
               <a:t>» </a:t>
             </a:r>
             <a:r>
-              <a:rPr lang="en-US" sz="2800" dirty="0"/>
+              <a:rPr lang="en-US" sz="2800" dirty="0" smtClean="0"/>
               <a:t>|</a:t>
             </a:r>
             <a:r>
               <a:rPr lang="ru-RU" sz="2800" dirty="0" smtClean="0"/>
-              <a:t> </a:t>
-            </a:r>
-            <a:r>
-              <a:rPr lang="ru-RU" sz="2800" dirty="0"/>
-              <a:t>Эмерик Чаз, Карпер </a:t>
-            </a:r>
-            <a:r>
-              <a:rPr lang="ru-RU" sz="2800" dirty="0" smtClean="0"/>
-              <a:t>Брайен</a:t>
+              <a:t> Эмерик Чаз, Карпер Брайен</a:t>
             </a:r>
           </a:p>
           <a:p>
@@ -6557,7 +6547,11 @@
             </a:pPr>
             <a:r>
               <a:rPr lang="ru-RU" sz="2800" b="1" dirty="0" smtClean="0"/>
-              <a:t>«Структура </a:t>
+              <a:t>«</a:t>
+            </a:r>
+            <a:r>
+              <a:rPr lang="ru-RU" sz="2800" b="1" dirty="0" smtClean="0"/>
+              <a:t>Структура </a:t>
             </a:r>
             <a:r>
               <a:rPr lang="ru-RU" sz="2800" b="1" dirty="0"/>
@@ -6583,7 +6577,7 @@
               <a:buChar char="•"/>
             </a:pPr>
             <a:r>
-              <a:rPr lang="en-GB" sz="2800" dirty="0">
+              <a:rPr lang="en-GB" sz="2800" dirty="0" smtClean="0">
                 <a:hlinkClick r:id="rId2"/>
               </a:rPr>
               <a:t>learnyouahaskell.com/introduction</a:t>
@@ -6768,6 +6762,13 @@
   <p:clrMapOvr>
     <a:masterClrMapping/>
   </p:clrMapOvr>
+  <p:timing>
+    <p:tnLst>
+      <p:par>
+        <p:cTn id="1" dur="indefinite" restart="never" nodeType="tmRoot"/>
+      </p:par>
+    </p:tnLst>
+  </p:timing>
 </p:sld>
 </file>
 
@@ -6960,11 +6961,6 @@
               </a:rPr>
               <a:t>maxbarsukov</a:t>
             </a:r>
-            <a:endParaRPr lang="ru-RU" sz="3200" b="1" dirty="0">
-              <a:latin typeface="Fira Code Light" panose="020B0809050000020004" pitchFamily="49" charset="0"/>
-              <a:ea typeface="Fira Code Light" panose="020B0809050000020004" pitchFamily="49" charset="0"/>
-              <a:cs typeface="Arial" panose="020B0604020202020204" pitchFamily="34" charset="0"/>
-            </a:endParaRPr>
           </a:p>
         </p:txBody>
       </p:sp>
@@ -7312,7 +7308,6 @@
               <a:rPr lang="ru-RU" b="1" dirty="0"/>
               <a:t>функционального программирования</a:t>
             </a:r>
-            <a:endParaRPr lang="ru-RU" b="1" dirty="0"/>
           </a:p>
         </p:txBody>
       </p:sp>
@@ -7338,15 +7333,7 @@
           <a:p>
             <a:r>
               <a:rPr lang="ru-RU" sz="2400" b="1" dirty="0" smtClean="0"/>
-              <a:t>Барсуков </a:t>
-            </a:r>
-            <a:r>
-              <a:rPr lang="ru-RU" sz="2400" b="1" dirty="0" smtClean="0"/>
-              <a:t>М</a:t>
-            </a:r>
-            <a:r>
-              <a:rPr lang="ru-RU" sz="2400" b="1" dirty="0" smtClean="0"/>
-              <a:t>аксим</a:t>
+              <a:t>Барсуков Максим</a:t>
             </a:r>
           </a:p>
           <a:p>
@@ -8019,6 +8006,13 @@
   <p:clrMapOvr>
     <a:masterClrMapping/>
   </p:clrMapOvr>
+  <p:timing>
+    <p:tnLst>
+      <p:par>
+        <p:cTn id="1" dur="indefinite" restart="never" nodeType="tmRoot"/>
+      </p:par>
+    </p:tnLst>
+  </p:timing>
 </p:sld>
 </file>
 

</xml_diff>